<commit_message>
Correção no dataset do checkpoint 1
</commit_message>
<xml_diff>
--- a/Aula 05/2023.03.09 Aula 05 – Modelos de aprendizado supervisionados – Regressão v1.pptx
+++ b/Aula 05/2023.03.09 Aula 05 – Modelos de aprendizado supervisionados – Regressão v1.pptx
@@ -1163,6 +1163,90 @@
                 <a:latin typeface="Gotham HTF Light"/>
                 <a:cs typeface="Gotham HTF Light"/>
               </a:rPr>
+              <a:t>. </a:t>
+            </a:r>
+            <a:r>
+              <a:rPr lang="en-US" sz="1200" dirty="0" err="1">
+                <a:latin typeface="Gotham HTF Light"/>
+                <a:cs typeface="Gotham HTF Light"/>
+              </a:rPr>
+              <a:t>Quanto</a:t>
+            </a:r>
+            <a:r>
+              <a:rPr lang="en-US" sz="1200" dirty="0">
+                <a:latin typeface="Gotham HTF Light"/>
+                <a:cs typeface="Gotham HTF Light"/>
+              </a:rPr>
+              <a:t> </a:t>
+            </a:r>
+            <a:r>
+              <a:rPr lang="en-US" sz="1200" dirty="0" err="1">
+                <a:latin typeface="Gotham HTF Light"/>
+                <a:cs typeface="Gotham HTF Light"/>
+              </a:rPr>
+              <a:t>mais</a:t>
+            </a:r>
+            <a:r>
+              <a:rPr lang="en-US" sz="1200" dirty="0">
+                <a:latin typeface="Gotham HTF Light"/>
+                <a:cs typeface="Gotham HTF Light"/>
+              </a:rPr>
+              <a:t> </a:t>
+            </a:r>
+            <a:r>
+              <a:rPr lang="en-US" sz="1200" dirty="0" err="1">
+                <a:latin typeface="Gotham HTF Light"/>
+                <a:cs typeface="Gotham HTF Light"/>
+              </a:rPr>
+              <a:t>perto</a:t>
+            </a:r>
+            <a:r>
+              <a:rPr lang="en-US" sz="1200" dirty="0">
+                <a:latin typeface="Gotham HTF Light"/>
+                <a:cs typeface="Gotham HTF Light"/>
+              </a:rPr>
+              <a:t> de 1, </a:t>
+            </a:r>
+            <a:r>
+              <a:rPr lang="en-US" sz="1200" dirty="0" err="1">
+                <a:latin typeface="Gotham HTF Light"/>
+                <a:cs typeface="Gotham HTF Light"/>
+              </a:rPr>
+              <a:t>melhor</a:t>
+            </a:r>
+            <a:r>
+              <a:rPr lang="en-US" sz="1200" dirty="0">
+                <a:latin typeface="Gotham HTF Light"/>
+                <a:cs typeface="Gotham HTF Light"/>
+              </a:rPr>
+              <a:t> é o </a:t>
+            </a:r>
+            <a:r>
+              <a:rPr lang="en-US" sz="1200" dirty="0" err="1">
+                <a:latin typeface="Gotham HTF Light"/>
+                <a:cs typeface="Gotham HTF Light"/>
+              </a:rPr>
+              <a:t>seu</a:t>
+            </a:r>
+            <a:r>
+              <a:rPr lang="en-US" sz="1200" dirty="0">
+                <a:latin typeface="Gotham HTF Light"/>
+                <a:cs typeface="Gotham HTF Light"/>
+              </a:rPr>
+              <a:t> </a:t>
+            </a:r>
+            <a:r>
+              <a:rPr lang="en-US" sz="1200" dirty="0" err="1">
+                <a:latin typeface="Gotham HTF Light"/>
+                <a:cs typeface="Gotham HTF Light"/>
+              </a:rPr>
+              <a:t>modelo</a:t>
+            </a:r>
+            <a:r>
+              <a:rPr lang="en-US" sz="1200" dirty="0">
+                <a:latin typeface="Gotham HTF Light"/>
+                <a:cs typeface="Gotham HTF Light"/>
+              </a:rPr>
               <a:t>. É </a:t>
             </a:r>
             <a:r>
@@ -1187,7 +1271,7 @@
                 <a:effectLst/>
                 <a:latin typeface="source-serif-pro"/>
               </a:rPr>
-              <a:t>Isso ocorre uma vez que os otimizadores dos algoritmos de regressão utilizam da correlação dos dados forma a incrementar o valor do R-Quadrado injustamente, o que causa um aumento sistemático desse valor conforme novas medidas são adicionadas;</a:t>
+              <a:t>Isso ocorre uma vez que os otimizadores dos algoritmos de regressão utilizam da correlação dos dados forma a incrementar o valor do R-Quadrado injustamente, o que causa um aumento sistemático desse valor conforme novas medidas são adicionadas; </a:t>
             </a:r>
             <a:endParaRPr lang="pt-BR" dirty="0"/>
           </a:p>
@@ -13905,18 +13989,25 @@
               <a:buChar char="v"/>
             </a:pPr>
             <a:r>
+              <a:rPr lang="en-US" sz="2400" dirty="0">
+                <a:latin typeface="Gotham HTF Light"/>
+                <a:cs typeface="Gotham HTF Light"/>
+              </a:rPr>
+              <a:t>Outros </a:t>
+            </a:r>
+            <a:r>
               <a:rPr lang="en-US" sz="2400" dirty="0" err="1">
                 <a:latin typeface="Gotham HTF Light"/>
                 <a:cs typeface="Gotham HTF Light"/>
               </a:rPr>
-              <a:t>Regressão</a:t>
+              <a:t>algoritmos</a:t>
             </a:r>
             <a:r>
               <a:rPr lang="en-US" sz="2400" dirty="0">
                 <a:latin typeface="Gotham HTF Light"/>
                 <a:cs typeface="Gotham HTF Light"/>
               </a:rPr>
-              <a:t> Linear (Y = A + BX)</a:t>
+              <a:t>:</a:t>
             </a:r>
           </a:p>
         </p:txBody>
@@ -13936,7 +14027,7 @@
         <p:spPr>
           <a:xfrm>
             <a:off x="251520" y="1629076"/>
-            <a:ext cx="8496944" cy="1295868"/>
+            <a:ext cx="8496944" cy="2126864"/>
           </a:xfrm>
           <a:prstGeom prst="rect">
             <a:avLst/>
@@ -13963,202 +14054,9 @@
               <a:rPr lang="pt-BR" dirty="0">
                 <a:latin typeface="Gotham HTF"/>
               </a:rPr>
-              <a:t>modelo de Regressão simples e popular que se ajusta a um conjunto de dados com uma linha reta. Ele é útil quando há uma relação linear entre as variáveis dependentes e independentes.</a:t>
-            </a:r>
-            <a:endParaRPr lang="en-US" sz="1400" dirty="0">
-              <a:latin typeface="Gotham HTF"/>
-              <a:cs typeface="Gotham HTF Light"/>
-            </a:endParaRPr>
-          </a:p>
-        </p:txBody>
-      </p:sp>
-      <p:sp>
-        <p:nvSpPr>
-          <p:cNvPr id="7" name="CaixaDeTexto 6">
-            <a:extLst>
-              <a:ext uri="{FF2B5EF4-FFF2-40B4-BE49-F238E27FC236}">
-                <a16:creationId xmlns:a16="http://schemas.microsoft.com/office/drawing/2014/main" id="{94CCF1FD-9686-DF3B-6C51-986FBFF35D25}"/>
-              </a:ext>
-            </a:extLst>
-          </p:cNvPr>
-          <p:cNvSpPr txBox="1"/>
-          <p:nvPr/>
-        </p:nvSpPr>
-        <p:spPr>
-          <a:xfrm>
-            <a:off x="251520" y="3459677"/>
-            <a:ext cx="6301680" cy="506292"/>
-          </a:xfrm>
-          <a:prstGeom prst="rect">
-            <a:avLst/>
-          </a:prstGeom>
-          <a:noFill/>
-        </p:spPr>
-        <p:txBody>
-          <a:bodyPr wrap="square">
-            <a:spAutoFit/>
-          </a:bodyPr>
-          <a:lstStyle/>
-          <a:p>
-            <a:pPr marL="285750" indent="-285750">
-              <a:lnSpc>
-                <a:spcPct val="150000"/>
-              </a:lnSpc>
-              <a:buClr>
-                <a:srgbClr val="ED265B"/>
-              </a:buClr>
-              <a:buFont typeface="Wingdings" panose="05000000000000000000" pitchFamily="2" charset="2"/>
-              <a:buChar char="v"/>
-            </a:pPr>
-            <a:r>
-              <a:rPr lang="en-US" sz="2000" dirty="0" err="1">
-                <a:latin typeface="Gotham HTF Light"/>
-                <a:cs typeface="Gotham HTF Light"/>
-              </a:rPr>
-              <a:t>Regressão</a:t>
-            </a:r>
-            <a:r>
-              <a:rPr lang="en-US" sz="2000" dirty="0">
-                <a:latin typeface="Gotham HTF Light"/>
-                <a:cs typeface="Gotham HTF Light"/>
-              </a:rPr>
-              <a:t> </a:t>
-            </a:r>
-            <a:r>
-              <a:rPr lang="en-US" sz="2000" dirty="0" err="1">
-                <a:latin typeface="Gotham HTF Light"/>
-                <a:cs typeface="Gotham HTF Light"/>
-              </a:rPr>
-              <a:t>Polinomial</a:t>
-            </a:r>
-            <a:r>
-              <a:rPr lang="en-US" sz="2000" dirty="0">
-                <a:latin typeface="Gotham HTF Light"/>
-                <a:cs typeface="Gotham HTF Light"/>
-              </a:rPr>
-              <a:t> ( Y = A</a:t>
-            </a:r>
-            <a:r>
-              <a:rPr lang="en-US" sz="2000" baseline="-25000" dirty="0">
-                <a:latin typeface="Gotham HTF Light"/>
-                <a:cs typeface="Gotham HTF Light"/>
-              </a:rPr>
-              <a:t>0</a:t>
-            </a:r>
-            <a:r>
-              <a:rPr lang="en-US" sz="2000" dirty="0">
-                <a:latin typeface="Gotham HTF Light"/>
-                <a:cs typeface="Gotham HTF Light"/>
-              </a:rPr>
-              <a:t> + A</a:t>
-            </a:r>
-            <a:r>
-              <a:rPr lang="en-US" sz="2000" baseline="-25000" dirty="0">
-                <a:latin typeface="Gotham HTF Light"/>
-                <a:cs typeface="Gotham HTF Light"/>
-              </a:rPr>
-              <a:t>1</a:t>
-            </a:r>
-            <a:r>
-              <a:rPr lang="en-US" sz="2000" dirty="0">
-                <a:latin typeface="Gotham HTF Light"/>
-                <a:cs typeface="Gotham HTF Light"/>
-              </a:rPr>
-              <a:t>X + A</a:t>
-            </a:r>
-            <a:r>
-              <a:rPr lang="en-US" sz="2000" baseline="-25000" dirty="0">
-                <a:latin typeface="Gotham HTF Light"/>
-                <a:cs typeface="Gotham HTF Light"/>
-              </a:rPr>
-              <a:t>2</a:t>
-            </a:r>
-            <a:r>
-              <a:rPr lang="en-US" sz="2000" dirty="0">
-                <a:latin typeface="Gotham HTF Light"/>
-                <a:cs typeface="Gotham HTF Light"/>
-              </a:rPr>
-              <a:t>X</a:t>
-            </a:r>
-            <a:r>
-              <a:rPr lang="en-US" sz="2000" baseline="30000" dirty="0">
-                <a:latin typeface="Gotham HTF Light"/>
-                <a:cs typeface="Gotham HTF Light"/>
-              </a:rPr>
-              <a:t>2</a:t>
-            </a:r>
-            <a:r>
-              <a:rPr lang="en-US" sz="2000" dirty="0">
-                <a:latin typeface="Gotham HTF Light"/>
-                <a:cs typeface="Gotham HTF Light"/>
-              </a:rPr>
-              <a:t> + … + </a:t>
-            </a:r>
-            <a:r>
-              <a:rPr lang="en-US" sz="2000" dirty="0" err="1">
-                <a:latin typeface="Gotham HTF Light"/>
-                <a:cs typeface="Gotham HTF Light"/>
-              </a:rPr>
-              <a:t>A</a:t>
-            </a:r>
-            <a:r>
-              <a:rPr lang="en-US" sz="2000" baseline="-25000" dirty="0" err="1">
-                <a:latin typeface="Gotham HTF Light"/>
-                <a:cs typeface="Gotham HTF Light"/>
-              </a:rPr>
-              <a:t>n</a:t>
-            </a:r>
-            <a:r>
-              <a:rPr lang="en-US" sz="2000" dirty="0" err="1">
-                <a:latin typeface="Gotham HTF Light"/>
-                <a:cs typeface="Gotham HTF Light"/>
-              </a:rPr>
-              <a:t>X</a:t>
-            </a:r>
-            <a:r>
-              <a:rPr lang="en-US" sz="2000" baseline="30000" dirty="0" err="1">
-                <a:latin typeface="Gotham HTF Light"/>
-                <a:cs typeface="Gotham HTF Light"/>
-              </a:rPr>
-              <a:t>n</a:t>
-            </a:r>
-            <a:r>
-              <a:rPr lang="en-US" sz="2000" dirty="0">
-                <a:latin typeface="Gotham HTF Light"/>
-                <a:cs typeface="Gotham HTF Light"/>
-              </a:rPr>
-              <a:t>)</a:t>
-            </a:r>
-          </a:p>
-        </p:txBody>
-      </p:sp>
-      <p:sp>
-        <p:nvSpPr>
-          <p:cNvPr id="8" name="CaixaDeTexto 7">
-            <a:extLst>
-              <a:ext uri="{FF2B5EF4-FFF2-40B4-BE49-F238E27FC236}">
-                <a16:creationId xmlns:a16="http://schemas.microsoft.com/office/drawing/2014/main" id="{8D7C99BD-2E55-53FC-A483-2057C356AC0C}"/>
-              </a:ext>
-            </a:extLst>
-          </p:cNvPr>
-          <p:cNvSpPr txBox="1"/>
-          <p:nvPr/>
-        </p:nvSpPr>
-        <p:spPr>
-          <a:xfrm>
-            <a:off x="251520" y="3988137"/>
-            <a:ext cx="8496944" cy="1295868"/>
-          </a:xfrm>
-          <a:prstGeom prst="rect">
-            <a:avLst/>
-          </a:prstGeom>
-          <a:noFill/>
-        </p:spPr>
-        <p:txBody>
-          <a:bodyPr wrap="square">
-            <a:spAutoFit/>
-          </a:bodyPr>
-          <a:lstStyle/>
+              <a:t>Árvores de regressão;</a:t>
+            </a:r>
+          </a:p>
           <a:p>
             <a:pPr marL="800100" lvl="1" indent="-342900">
               <a:lnSpc>
@@ -14171,12 +14069,112 @@
               <a:buChar char="Ø"/>
             </a:pPr>
             <a:r>
+              <a:rPr lang="pt-BR" dirty="0" err="1">
+                <a:latin typeface="Gotham HTF"/>
+                <a:cs typeface="Gotham HTF Light"/>
+              </a:rPr>
+              <a:t>Support</a:t>
+            </a:r>
+            <a:r>
               <a:rPr lang="pt-BR" dirty="0">
                 <a:latin typeface="Gotham HTF"/>
-              </a:rPr>
-              <a:t>modelo de Regressão que se ajusta a um conjunto de dados com uma curva polinomial. Ele é útil quando há uma relação não linear entre as variáveis dependentes e independentes.</a:t>
-            </a:r>
-            <a:endParaRPr lang="en-US" sz="1400" dirty="0">
+                <a:cs typeface="Gotham HTF Light"/>
+              </a:rPr>
+              <a:t> Vector </a:t>
+            </a:r>
+            <a:r>
+              <a:rPr lang="pt-BR" dirty="0" err="1">
+                <a:latin typeface="Gotham HTF"/>
+                <a:cs typeface="Gotham HTF Light"/>
+              </a:rPr>
+              <a:t>Machine</a:t>
+            </a:r>
+            <a:r>
+              <a:rPr lang="pt-BR" dirty="0">
+                <a:latin typeface="Gotham HTF"/>
+                <a:cs typeface="Gotham HTF Light"/>
+              </a:rPr>
+              <a:t>;</a:t>
+            </a:r>
+          </a:p>
+          <a:p>
+            <a:pPr marL="800100" lvl="1" indent="-342900">
+              <a:lnSpc>
+                <a:spcPct val="150000"/>
+              </a:lnSpc>
+              <a:buClr>
+                <a:srgbClr val="ED265B"/>
+              </a:buClr>
+              <a:buFont typeface="Wingdings" panose="05000000000000000000" pitchFamily="2" charset="2"/>
+              <a:buChar char="Ø"/>
+            </a:pPr>
+            <a:r>
+              <a:rPr lang="pt-BR" dirty="0">
+                <a:latin typeface="Gotham HTF"/>
+                <a:cs typeface="Gotham HTF Light"/>
+              </a:rPr>
+              <a:t>Random Forest;</a:t>
+            </a:r>
+          </a:p>
+          <a:p>
+            <a:pPr marL="800100" lvl="1" indent="-342900">
+              <a:lnSpc>
+                <a:spcPct val="150000"/>
+              </a:lnSpc>
+              <a:buClr>
+                <a:srgbClr val="ED265B"/>
+              </a:buClr>
+              <a:buFont typeface="Wingdings" panose="05000000000000000000" pitchFamily="2" charset="2"/>
+              <a:buChar char="Ø"/>
+            </a:pPr>
+            <a:r>
+              <a:rPr lang="pt-BR" dirty="0" err="1">
+                <a:latin typeface="Gotham HTF"/>
+                <a:cs typeface="Gotham HTF Light"/>
+              </a:rPr>
+              <a:t>Gradient</a:t>
+            </a:r>
+            <a:r>
+              <a:rPr lang="pt-BR" dirty="0">
+                <a:latin typeface="Gotham HTF"/>
+                <a:cs typeface="Gotham HTF Light"/>
+              </a:rPr>
+              <a:t> </a:t>
+            </a:r>
+            <a:r>
+              <a:rPr lang="pt-BR" dirty="0" err="1">
+                <a:latin typeface="Gotham HTF"/>
+                <a:cs typeface="Gotham HTF Light"/>
+              </a:rPr>
+              <a:t>Boost</a:t>
+            </a:r>
+            <a:r>
+              <a:rPr lang="pt-BR" dirty="0">
+                <a:latin typeface="Gotham HTF"/>
+                <a:cs typeface="Gotham HTF Light"/>
+              </a:rPr>
+              <a:t>;</a:t>
+            </a:r>
+          </a:p>
+          <a:p>
+            <a:pPr marL="800100" lvl="1" indent="-342900">
+              <a:lnSpc>
+                <a:spcPct val="150000"/>
+              </a:lnSpc>
+              <a:buClr>
+                <a:srgbClr val="ED265B"/>
+              </a:buClr>
+              <a:buFont typeface="Wingdings" panose="05000000000000000000" pitchFamily="2" charset="2"/>
+              <a:buChar char="Ø"/>
+            </a:pPr>
+            <a:r>
+              <a:rPr lang="pt-BR" dirty="0">
+                <a:latin typeface="Gotham HTF"/>
+                <a:cs typeface="Gotham HTF Light"/>
+              </a:rPr>
+              <a:t>KNN;</a:t>
+            </a:r>
+            <a:endParaRPr lang="en-US" dirty="0">
               <a:latin typeface="Gotham HTF"/>
               <a:cs typeface="Gotham HTF Light"/>
             </a:endParaRPr>
@@ -14193,13 +14191,13 @@
   <p:clrMapOvr>
     <a:masterClrMapping/>
   </p:clrMapOvr>
-  <mc:AlternateContent xmlns:mc="http://schemas.openxmlformats.org/markup-compatibility/2006">
-    <mc:Choice xmlns:p14="http://schemas.microsoft.com/office/powerpoint/2010/main" Requires="p14">
+  <mc:AlternateContent xmlns:mc="http://schemas.openxmlformats.org/markup-compatibility/2006" xmlns:p14="http://schemas.microsoft.com/office/powerpoint/2010/main">
+    <mc:Choice Requires="p14">
       <p:transition spd="med" p14:dur="700">
         <p:fade/>
       </p:transition>
     </mc:Choice>
-    <mc:Fallback>
+    <mc:Fallback xmlns="">
       <p:transition spd="med">
         <p:fade/>
       </p:transition>
@@ -14319,112 +14317,6 @@
                       </p:childTnLst>
                     </p:cTn>
                   </p:par>
-                  <p:par>
-                    <p:cTn id="13" fill="hold">
-                      <p:stCondLst>
-                        <p:cond delay="indefinite"/>
-                      </p:stCondLst>
-                      <p:childTnLst>
-                        <p:par>
-                          <p:cTn id="14" fill="hold">
-                            <p:stCondLst>
-                              <p:cond delay="0"/>
-                            </p:stCondLst>
-                            <p:childTnLst>
-                              <p:par>
-                                <p:cTn id="15" presetID="10" presetClass="entr" presetSubtype="0" fill="hold" grpId="0" nodeType="clickEffect">
-                                  <p:stCondLst>
-                                    <p:cond delay="0"/>
-                                  </p:stCondLst>
-                                  <p:childTnLst>
-                                    <p:set>
-                                      <p:cBhvr>
-                                        <p:cTn id="16" dur="1" fill="hold">
-                                          <p:stCondLst>
-                                            <p:cond delay="0"/>
-                                          </p:stCondLst>
-                                        </p:cTn>
-                                        <p:tgtEl>
-                                          <p:spTgt spid="7"/>
-                                        </p:tgtEl>
-                                        <p:attrNameLst>
-                                          <p:attrName>style.visibility</p:attrName>
-                                        </p:attrNameLst>
-                                      </p:cBhvr>
-                                      <p:to>
-                                        <p:strVal val="visible"/>
-                                      </p:to>
-                                    </p:set>
-                                    <p:animEffect transition="in" filter="fade">
-                                      <p:cBhvr>
-                                        <p:cTn id="17" dur="500"/>
-                                        <p:tgtEl>
-                                          <p:spTgt spid="7"/>
-                                        </p:tgtEl>
-                                      </p:cBhvr>
-                                    </p:animEffect>
-                                  </p:childTnLst>
-                                </p:cTn>
-                              </p:par>
-                            </p:childTnLst>
-                          </p:cTn>
-                        </p:par>
-                      </p:childTnLst>
-                    </p:cTn>
-                  </p:par>
-                  <p:par>
-                    <p:cTn id="18" fill="hold">
-                      <p:stCondLst>
-                        <p:cond delay="indefinite"/>
-                      </p:stCondLst>
-                      <p:childTnLst>
-                        <p:par>
-                          <p:cTn id="19" fill="hold">
-                            <p:stCondLst>
-                              <p:cond delay="0"/>
-                            </p:stCondLst>
-                            <p:childTnLst>
-                              <p:par>
-                                <p:cTn id="20" presetID="10" presetClass="entr" presetSubtype="0" fill="hold" grpId="0" nodeType="clickEffect">
-                                  <p:stCondLst>
-                                    <p:cond delay="0"/>
-                                  </p:stCondLst>
-                                  <p:childTnLst>
-                                    <p:set>
-                                      <p:cBhvr>
-                                        <p:cTn id="21" dur="1" fill="hold">
-                                          <p:stCondLst>
-                                            <p:cond delay="0"/>
-                                          </p:stCondLst>
-                                        </p:cTn>
-                                        <p:tgtEl>
-                                          <p:spTgt spid="8"/>
-                                        </p:tgtEl>
-                                        <p:attrNameLst>
-                                          <p:attrName>style.visibility</p:attrName>
-                                        </p:attrNameLst>
-                                      </p:cBhvr>
-                                      <p:to>
-                                        <p:strVal val="visible"/>
-                                      </p:to>
-                                    </p:set>
-                                    <p:animEffect transition="in" filter="fade">
-                                      <p:cBhvr>
-                                        <p:cTn id="22" dur="500"/>
-                                        <p:tgtEl>
-                                          <p:spTgt spid="8"/>
-                                        </p:tgtEl>
-                                      </p:cBhvr>
-                                    </p:animEffect>
-                                  </p:childTnLst>
-                                </p:cTn>
-                              </p:par>
-                            </p:childTnLst>
-                          </p:cTn>
-                        </p:par>
-                      </p:childTnLst>
-                    </p:cTn>
-                  </p:par>
                 </p:childTnLst>
               </p:cTn>
               <p:prevCondLst>
@@ -14449,8 +14341,6 @@
     <p:bldLst>
       <p:bldP spid="3" grpId="0"/>
       <p:bldP spid="4" grpId="0"/>
-      <p:bldP spid="7" grpId="0"/>
-      <p:bldP spid="8" grpId="0"/>
     </p:bldLst>
   </p:timing>
 </p:sld>

</xml_diff>

<commit_message>
Atualizaçao da aula 05
</commit_message>
<xml_diff>
--- a/Aula 05/2023.03.09 Aula 05 – Modelos de aprendizado supervisionados – Regressão v1.pptx
+++ b/Aula 05/2023.03.09 Aula 05 – Modelos de aprendizado supervisionados – Regressão v1.pptx
@@ -6,7 +6,7 @@
     <p:sldMasterId id="2147483699" r:id="rId2"/>
   </p:sldMasterIdLst>
   <p:notesMasterIdLst>
-    <p:notesMasterId r:id="rId15"/>
+    <p:notesMasterId r:id="rId16"/>
   </p:notesMasterIdLst>
   <p:sldIdLst>
     <p:sldId id="398" r:id="rId3"/>
@@ -17,10 +17,11 @@
     <p:sldId id="814" r:id="rId8"/>
     <p:sldId id="819" r:id="rId9"/>
     <p:sldId id="826" r:id="rId10"/>
-    <p:sldId id="823" r:id="rId11"/>
-    <p:sldId id="816" r:id="rId12"/>
-    <p:sldId id="824" r:id="rId13"/>
-    <p:sldId id="822" r:id="rId14"/>
+    <p:sldId id="828" r:id="rId11"/>
+    <p:sldId id="823" r:id="rId12"/>
+    <p:sldId id="816" r:id="rId13"/>
+    <p:sldId id="824" r:id="rId14"/>
+    <p:sldId id="822" r:id="rId15"/>
   </p:sldIdLst>
   <p:sldSz cx="9144000" cy="6858000" type="screen4x3"/>
   <p:notesSz cx="6858000" cy="9144000"/>
@@ -221,7 +222,7 @@
             <a:fld id="{4EA5E1ED-E65E-440E-8A4B-5F5DC973F797}" type="datetimeFigureOut">
               <a:rPr lang="pt-BR" smtClean="0"/>
               <a:pPr/>
-              <a:t>06/03/2023</a:t>
+              <a:t>09/03/2023</a:t>
             </a:fld>
             <a:endParaRPr lang="pt-BR"/>
           </a:p>
@@ -953,28 +954,7 @@
           <a:bodyPr/>
           <a:lstStyle/>
           <a:p>
-            <a:r>
-              <a:rPr lang="pt-BR" dirty="0"/>
-              <a:t>Basicamente vamos ver dois algoritmos de regressão:</a:t>
-            </a:r>
-          </a:p>
-          <a:p>
             <a:endParaRPr lang="pt-BR" dirty="0"/>
-          </a:p>
-          <a:p>
-            <a:r>
-              <a:rPr lang="pt-BR" dirty="0"/>
-              <a:t>Regressão Linear que consiste em um modelo para aproximar os dados a uma reta;</a:t>
-            </a:r>
-          </a:p>
-          <a:p>
-            <a:endParaRPr lang="pt-BR" dirty="0"/>
-          </a:p>
-          <a:p>
-            <a:r>
-              <a:rPr lang="pt-BR" dirty="0"/>
-              <a:t>E a regressão Polinomial que consiste em um modelo para aproximar os dados a uma equação polinomial;</a:t>
-            </a:r>
           </a:p>
         </p:txBody>
       </p:sp>
@@ -1059,220 +1039,6 @@
           <a:bodyPr/>
           <a:lstStyle/>
           <a:p>
-            <a:r>
-              <a:rPr lang="pt-BR" dirty="0"/>
-              <a:t>MSE = É a soma das diferenças entre o valor predito e o valor real elevados ao quadrado. Em seguida, divide-se a soma pela quantidade de elementos preditos. Quanto maior, pior é o modelo. Como estamos elevando o erro ao quadrado. Um erro muito grande destoa muito, o que torna uma métrica de avaliação muito boa para casos em que erros não são tolerados.</a:t>
-            </a:r>
-          </a:p>
-          <a:p>
-            <a:endParaRPr lang="pt-BR" dirty="0"/>
-          </a:p>
-          <a:p>
-            <a:r>
-              <a:rPr lang="pt-BR" dirty="0"/>
-              <a:t>RMSE = Aqui tiramos a raiz quadrado do MSE. Porque? Porque no caso anterior estamos elevando tudo ao quadrado, o que torna um pouco difícil você fazer um paralelo quando prevê um valor... Por exemplo, o valor está em unidade, mas o erro está ao quadrado. Não é intuitivo.</a:t>
-            </a:r>
-          </a:p>
-          <a:p>
-            <a:endParaRPr lang="pt-BR" dirty="0"/>
-          </a:p>
-          <a:p>
-            <a:r>
-              <a:rPr lang="pt-BR" dirty="0"/>
-              <a:t>R2 = </a:t>
-            </a:r>
-            <a:r>
-              <a:rPr lang="en-US" sz="1200" dirty="0" err="1">
-                <a:latin typeface="Gotham HTF Light"/>
-                <a:cs typeface="Gotham HTF Light"/>
-              </a:rPr>
-              <a:t>Diz</a:t>
-            </a:r>
-            <a:r>
-              <a:rPr lang="en-US" sz="1200" dirty="0">
-                <a:latin typeface="Gotham HTF Light"/>
-                <a:cs typeface="Gotham HTF Light"/>
-              </a:rPr>
-              <a:t> o </a:t>
-            </a:r>
-            <a:r>
-              <a:rPr lang="en-US" sz="1200" dirty="0" err="1">
-                <a:latin typeface="Gotham HTF Light"/>
-                <a:cs typeface="Gotham HTF Light"/>
-              </a:rPr>
-              <a:t>quão</a:t>
-            </a:r>
-            <a:r>
-              <a:rPr lang="en-US" sz="1200" dirty="0">
-                <a:latin typeface="Gotham HTF Light"/>
-                <a:cs typeface="Gotham HTF Light"/>
-              </a:rPr>
-              <a:t> </a:t>
-            </a:r>
-            <a:r>
-              <a:rPr lang="en-US" sz="1200" dirty="0" err="1">
-                <a:latin typeface="Gotham HTF Light"/>
-                <a:cs typeface="Gotham HTF Light"/>
-              </a:rPr>
-              <a:t>próximas</a:t>
-            </a:r>
-            <a:r>
-              <a:rPr lang="en-US" sz="1200" dirty="0">
-                <a:latin typeface="Gotham HTF Light"/>
-                <a:cs typeface="Gotham HTF Light"/>
-              </a:rPr>
-              <a:t> as </a:t>
-            </a:r>
-            <a:r>
-              <a:rPr lang="en-US" sz="1200" dirty="0" err="1">
-                <a:latin typeface="Gotham HTF Light"/>
-                <a:cs typeface="Gotham HTF Light"/>
-              </a:rPr>
-              <a:t>medidas</a:t>
-            </a:r>
-            <a:r>
-              <a:rPr lang="en-US" sz="1200" dirty="0">
-                <a:latin typeface="Gotham HTF Light"/>
-                <a:cs typeface="Gotham HTF Light"/>
-              </a:rPr>
-              <a:t> reais </a:t>
-            </a:r>
-            <a:r>
-              <a:rPr lang="en-US" sz="1200" dirty="0" err="1">
-                <a:latin typeface="Gotham HTF Light"/>
-                <a:cs typeface="Gotham HTF Light"/>
-              </a:rPr>
-              <a:t>estão</a:t>
-            </a:r>
-            <a:r>
-              <a:rPr lang="en-US" sz="1200" dirty="0">
-                <a:latin typeface="Gotham HTF Light"/>
-                <a:cs typeface="Gotham HTF Light"/>
-              </a:rPr>
-              <a:t> da do </a:t>
-            </a:r>
-            <a:r>
-              <a:rPr lang="en-US" sz="1200" dirty="0" err="1">
-                <a:latin typeface="Gotham HTF Light"/>
-                <a:cs typeface="Gotham HTF Light"/>
-              </a:rPr>
-              <a:t>modelo</a:t>
-            </a:r>
-            <a:r>
-              <a:rPr lang="en-US" sz="1200" dirty="0">
-                <a:latin typeface="Gotham HTF Light"/>
-                <a:cs typeface="Gotham HTF Light"/>
-              </a:rPr>
-              <a:t>. </a:t>
-            </a:r>
-            <a:r>
-              <a:rPr lang="en-US" sz="1200" dirty="0" err="1">
-                <a:latin typeface="Gotham HTF Light"/>
-                <a:cs typeface="Gotham HTF Light"/>
-              </a:rPr>
-              <a:t>Quanto</a:t>
-            </a:r>
-            <a:r>
-              <a:rPr lang="en-US" sz="1200" dirty="0">
-                <a:latin typeface="Gotham HTF Light"/>
-                <a:cs typeface="Gotham HTF Light"/>
-              </a:rPr>
-              <a:t> </a:t>
-            </a:r>
-            <a:r>
-              <a:rPr lang="en-US" sz="1200" dirty="0" err="1">
-                <a:latin typeface="Gotham HTF Light"/>
-                <a:cs typeface="Gotham HTF Light"/>
-              </a:rPr>
-              <a:t>mais</a:t>
-            </a:r>
-            <a:r>
-              <a:rPr lang="en-US" sz="1200" dirty="0">
-                <a:latin typeface="Gotham HTF Light"/>
-                <a:cs typeface="Gotham HTF Light"/>
-              </a:rPr>
-              <a:t> </a:t>
-            </a:r>
-            <a:r>
-              <a:rPr lang="en-US" sz="1200" dirty="0" err="1">
-                <a:latin typeface="Gotham HTF Light"/>
-                <a:cs typeface="Gotham HTF Light"/>
-              </a:rPr>
-              <a:t>perto</a:t>
-            </a:r>
-            <a:r>
-              <a:rPr lang="en-US" sz="1200" dirty="0">
-                <a:latin typeface="Gotham HTF Light"/>
-                <a:cs typeface="Gotham HTF Light"/>
-              </a:rPr>
-              <a:t> de 1, </a:t>
-            </a:r>
-            <a:r>
-              <a:rPr lang="en-US" sz="1200" dirty="0" err="1">
-                <a:latin typeface="Gotham HTF Light"/>
-                <a:cs typeface="Gotham HTF Light"/>
-              </a:rPr>
-              <a:t>melhor</a:t>
-            </a:r>
-            <a:r>
-              <a:rPr lang="en-US" sz="1200" dirty="0">
-                <a:latin typeface="Gotham HTF Light"/>
-                <a:cs typeface="Gotham HTF Light"/>
-              </a:rPr>
-              <a:t> é o </a:t>
-            </a:r>
-            <a:r>
-              <a:rPr lang="en-US" sz="1200" dirty="0" err="1">
-                <a:latin typeface="Gotham HTF Light"/>
-                <a:cs typeface="Gotham HTF Light"/>
-              </a:rPr>
-              <a:t>seu</a:t>
-            </a:r>
-            <a:r>
-              <a:rPr lang="en-US" sz="1200" dirty="0">
-                <a:latin typeface="Gotham HTF Light"/>
-                <a:cs typeface="Gotham HTF Light"/>
-              </a:rPr>
-              <a:t> </a:t>
-            </a:r>
-            <a:r>
-              <a:rPr lang="en-US" sz="1200" dirty="0" err="1">
-                <a:latin typeface="Gotham HTF Light"/>
-                <a:cs typeface="Gotham HTF Light"/>
-              </a:rPr>
-              <a:t>modelo</a:t>
-            </a:r>
-            <a:r>
-              <a:rPr lang="en-US" sz="1200" dirty="0">
-                <a:latin typeface="Gotham HTF Light"/>
-                <a:cs typeface="Gotham HTF Light"/>
-              </a:rPr>
-              <a:t>. É </a:t>
-            </a:r>
-            <a:r>
-              <a:rPr lang="en-US" sz="1200" dirty="0" err="1">
-                <a:latin typeface="Gotham HTF Light"/>
-                <a:cs typeface="Gotham HTF Light"/>
-              </a:rPr>
-              <a:t>inviesado</a:t>
-            </a:r>
-            <a:r>
-              <a:rPr lang="en-US" sz="1200" dirty="0">
-                <a:latin typeface="Gotham HTF Light"/>
-                <a:cs typeface="Gotham HTF Light"/>
-              </a:rPr>
-              <a:t> </a:t>
-            </a:r>
-            <a:r>
-              <a:rPr lang="pt-BR" b="0" i="0" dirty="0">
-                <a:solidFill>
-                  <a:srgbClr val="292929"/>
-                </a:solidFill>
-                <a:effectLst/>
-                <a:latin typeface="source-serif-pro"/>
-              </a:rPr>
-              <a:t>Isso ocorre uma vez que os otimizadores dos algoritmos de regressão utilizam da correlação dos dados forma a incrementar o valor do R-Quadrado injustamente, o que causa um aumento sistemático desse valor conforme novas medidas são adicionadas; </a:t>
-            </a:r>
             <a:endParaRPr lang="pt-BR" dirty="0"/>
           </a:p>
         </p:txBody>
@@ -1295,7 +1061,7 @@
             <a:fld id="{FD0942CD-4DA8-49D4-9C3A-BA5FFA832728}" type="slidenum">
               <a:rPr lang="pt-BR" smtClean="0"/>
               <a:pPr/>
-              <a:t>10</a:t>
+              <a:t>9</a:t>
             </a:fld>
             <a:endParaRPr lang="pt-BR"/>
           </a:p>
@@ -1304,7 +1070,7 @@
     </p:spTree>
     <p:extLst>
       <p:ext uri="{BB962C8B-B14F-4D97-AF65-F5344CB8AC3E}">
-        <p14:creationId xmlns:p14="http://schemas.microsoft.com/office/powerpoint/2010/main" val="2961463164"/>
+        <p14:creationId xmlns:p14="http://schemas.microsoft.com/office/powerpoint/2010/main" val="1325711572"/>
       </p:ext>
     </p:extLst>
   </p:cSld>
@@ -1360,7 +1126,7 @@
           <a:p>
             <a:r>
               <a:rPr lang="pt-BR" dirty="0"/>
-              <a:t>R2 Score – Leva em consideração a quantidade de amostras (N) e (p) a quantidade de dados de entrada do modelo para remover o viés de otimização.</a:t>
+              <a:t>MSE = É a soma das diferenças entre o valor predito e o valor real elevados ao quadrado. Em seguida, divide-se a soma pela quantidade de elementos preditos. Quanto maior, pior é o modelo. Como estamos elevando o erro ao quadrado. Um erro muito grande destoa muito, o que torna uma métrica de avaliação muito boa para casos em que erros não são tolerados.</a:t>
             </a:r>
           </a:p>
           <a:p>
@@ -1369,16 +1135,210 @@
           <a:p>
             <a:r>
               <a:rPr lang="pt-BR" dirty="0"/>
-              <a:t>O MAE é a mesma coisa que o MSE, a diferença é que não pune os dados muito discrepantes. É usado para medir dados </a:t>
-            </a:r>
-            <a:r>
-              <a:rPr lang="pt-BR" dirty="0" err="1"/>
-              <a:t>sazionais</a:t>
-            </a:r>
+              <a:t>RMSE = Aqui tiramos a raiz quadrado do MSE. Porque? Porque no caso anterior estamos elevando tudo ao quadrado, o que torna um pouco difícil você fazer um paralelo quando prevê um valor... Por exemplo, o valor está em unidade, mas o erro está ao quadrado. Não é intuitivo.</a:t>
+            </a:r>
+          </a:p>
+          <a:p>
+            <a:endParaRPr lang="pt-BR" dirty="0"/>
+          </a:p>
+          <a:p>
             <a:r>
               <a:rPr lang="pt-BR" dirty="0"/>
-              <a:t>, como surtos de gripe.</a:t>
-            </a:r>
+              <a:t>R2 = </a:t>
+            </a:r>
+            <a:r>
+              <a:rPr lang="en-US" sz="1200" dirty="0" err="1">
+                <a:latin typeface="Gotham HTF Light"/>
+                <a:cs typeface="Gotham HTF Light"/>
+              </a:rPr>
+              <a:t>Diz</a:t>
+            </a:r>
+            <a:r>
+              <a:rPr lang="en-US" sz="1200" dirty="0">
+                <a:latin typeface="Gotham HTF Light"/>
+                <a:cs typeface="Gotham HTF Light"/>
+              </a:rPr>
+              <a:t> o </a:t>
+            </a:r>
+            <a:r>
+              <a:rPr lang="en-US" sz="1200" dirty="0" err="1">
+                <a:latin typeface="Gotham HTF Light"/>
+                <a:cs typeface="Gotham HTF Light"/>
+              </a:rPr>
+              <a:t>quão</a:t>
+            </a:r>
+            <a:r>
+              <a:rPr lang="en-US" sz="1200" dirty="0">
+                <a:latin typeface="Gotham HTF Light"/>
+                <a:cs typeface="Gotham HTF Light"/>
+              </a:rPr>
+              <a:t> </a:t>
+            </a:r>
+            <a:r>
+              <a:rPr lang="en-US" sz="1200" dirty="0" err="1">
+                <a:latin typeface="Gotham HTF Light"/>
+                <a:cs typeface="Gotham HTF Light"/>
+              </a:rPr>
+              <a:t>próximas</a:t>
+            </a:r>
+            <a:r>
+              <a:rPr lang="en-US" sz="1200" dirty="0">
+                <a:latin typeface="Gotham HTF Light"/>
+                <a:cs typeface="Gotham HTF Light"/>
+              </a:rPr>
+              <a:t> as </a:t>
+            </a:r>
+            <a:r>
+              <a:rPr lang="en-US" sz="1200" dirty="0" err="1">
+                <a:latin typeface="Gotham HTF Light"/>
+                <a:cs typeface="Gotham HTF Light"/>
+              </a:rPr>
+              <a:t>medidas</a:t>
+            </a:r>
+            <a:r>
+              <a:rPr lang="en-US" sz="1200" dirty="0">
+                <a:latin typeface="Gotham HTF Light"/>
+                <a:cs typeface="Gotham HTF Light"/>
+              </a:rPr>
+              <a:t> reais </a:t>
+            </a:r>
+            <a:r>
+              <a:rPr lang="en-US" sz="1200" dirty="0" err="1">
+                <a:latin typeface="Gotham HTF Light"/>
+                <a:cs typeface="Gotham HTF Light"/>
+              </a:rPr>
+              <a:t>estão</a:t>
+            </a:r>
+            <a:r>
+              <a:rPr lang="en-US" sz="1200" dirty="0">
+                <a:latin typeface="Gotham HTF Light"/>
+                <a:cs typeface="Gotham HTF Light"/>
+              </a:rPr>
+              <a:t> da do </a:t>
+            </a:r>
+            <a:r>
+              <a:rPr lang="en-US" sz="1200" dirty="0" err="1">
+                <a:latin typeface="Gotham HTF Light"/>
+                <a:cs typeface="Gotham HTF Light"/>
+              </a:rPr>
+              <a:t>modelo</a:t>
+            </a:r>
+            <a:r>
+              <a:rPr lang="en-US" sz="1200" dirty="0">
+                <a:latin typeface="Gotham HTF Light"/>
+                <a:cs typeface="Gotham HTF Light"/>
+              </a:rPr>
+              <a:t>. </a:t>
+            </a:r>
+            <a:r>
+              <a:rPr lang="en-US" sz="1200" dirty="0" err="1">
+                <a:latin typeface="Gotham HTF Light"/>
+                <a:cs typeface="Gotham HTF Light"/>
+              </a:rPr>
+              <a:t>Quanto</a:t>
+            </a:r>
+            <a:r>
+              <a:rPr lang="en-US" sz="1200" dirty="0">
+                <a:latin typeface="Gotham HTF Light"/>
+                <a:cs typeface="Gotham HTF Light"/>
+              </a:rPr>
+              <a:t> </a:t>
+            </a:r>
+            <a:r>
+              <a:rPr lang="en-US" sz="1200" dirty="0" err="1">
+                <a:latin typeface="Gotham HTF Light"/>
+                <a:cs typeface="Gotham HTF Light"/>
+              </a:rPr>
+              <a:t>mais</a:t>
+            </a:r>
+            <a:r>
+              <a:rPr lang="en-US" sz="1200" dirty="0">
+                <a:latin typeface="Gotham HTF Light"/>
+                <a:cs typeface="Gotham HTF Light"/>
+              </a:rPr>
+              <a:t> </a:t>
+            </a:r>
+            <a:r>
+              <a:rPr lang="en-US" sz="1200" dirty="0" err="1">
+                <a:latin typeface="Gotham HTF Light"/>
+                <a:cs typeface="Gotham HTF Light"/>
+              </a:rPr>
+              <a:t>perto</a:t>
+            </a:r>
+            <a:r>
+              <a:rPr lang="en-US" sz="1200" dirty="0">
+                <a:latin typeface="Gotham HTF Light"/>
+                <a:cs typeface="Gotham HTF Light"/>
+              </a:rPr>
+              <a:t> de 1, </a:t>
+            </a:r>
+            <a:r>
+              <a:rPr lang="en-US" sz="1200" dirty="0" err="1">
+                <a:latin typeface="Gotham HTF Light"/>
+                <a:cs typeface="Gotham HTF Light"/>
+              </a:rPr>
+              <a:t>melhor</a:t>
+            </a:r>
+            <a:r>
+              <a:rPr lang="en-US" sz="1200" dirty="0">
+                <a:latin typeface="Gotham HTF Light"/>
+                <a:cs typeface="Gotham HTF Light"/>
+              </a:rPr>
+              <a:t> é o </a:t>
+            </a:r>
+            <a:r>
+              <a:rPr lang="en-US" sz="1200" dirty="0" err="1">
+                <a:latin typeface="Gotham HTF Light"/>
+                <a:cs typeface="Gotham HTF Light"/>
+              </a:rPr>
+              <a:t>seu</a:t>
+            </a:r>
+            <a:r>
+              <a:rPr lang="en-US" sz="1200" dirty="0">
+                <a:latin typeface="Gotham HTF Light"/>
+                <a:cs typeface="Gotham HTF Light"/>
+              </a:rPr>
+              <a:t> </a:t>
+            </a:r>
+            <a:r>
+              <a:rPr lang="en-US" sz="1200" dirty="0" err="1">
+                <a:latin typeface="Gotham HTF Light"/>
+                <a:cs typeface="Gotham HTF Light"/>
+              </a:rPr>
+              <a:t>modelo</a:t>
+            </a:r>
+            <a:r>
+              <a:rPr lang="en-US" sz="1200" dirty="0">
+                <a:latin typeface="Gotham HTF Light"/>
+                <a:cs typeface="Gotham HTF Light"/>
+              </a:rPr>
+              <a:t>. É </a:t>
+            </a:r>
+            <a:r>
+              <a:rPr lang="en-US" sz="1200" dirty="0" err="1">
+                <a:latin typeface="Gotham HTF Light"/>
+                <a:cs typeface="Gotham HTF Light"/>
+              </a:rPr>
+              <a:t>inviesado</a:t>
+            </a:r>
+            <a:r>
+              <a:rPr lang="en-US" sz="1200" dirty="0">
+                <a:latin typeface="Gotham HTF Light"/>
+                <a:cs typeface="Gotham HTF Light"/>
+              </a:rPr>
+              <a:t> </a:t>
+            </a:r>
+            <a:r>
+              <a:rPr lang="pt-BR" b="0" i="0" dirty="0">
+                <a:solidFill>
+                  <a:srgbClr val="292929"/>
+                </a:solidFill>
+                <a:effectLst/>
+                <a:latin typeface="source-serif-pro"/>
+              </a:rPr>
+              <a:t>Isso ocorre uma vez que os otimizadores dos algoritmos de regressão utilizam da correlação dos dados forma a incrementar o valor do R-Quadrado injustamente, o que causa um aumento sistemático desse valor conforme novas medidas são adicionadas; </a:t>
+            </a:r>
+            <a:endParaRPr lang="pt-BR" dirty="0"/>
           </a:p>
         </p:txBody>
       </p:sp>
@@ -1401,6 +1361,111 @@
               <a:rPr lang="pt-BR" smtClean="0"/>
               <a:pPr/>
               <a:t>11</a:t>
+            </a:fld>
+            <a:endParaRPr lang="pt-BR"/>
+          </a:p>
+        </p:txBody>
+      </p:sp>
+    </p:spTree>
+    <p:extLst>
+      <p:ext uri="{BB962C8B-B14F-4D97-AF65-F5344CB8AC3E}">
+        <p14:creationId xmlns:p14="http://schemas.microsoft.com/office/powerpoint/2010/main" val="2961463164"/>
+      </p:ext>
+    </p:extLst>
+  </p:cSld>
+  <p:clrMapOvr>
+    <a:masterClrMapping/>
+  </p:clrMapOvr>
+</p:notes>
+</file>
+
+<file path=ppt/notesSlides/notesSlide8.xml><?xml version="1.0" encoding="utf-8"?>
+<p:notes xmlns:a="http://schemas.openxmlformats.org/drawingml/2006/main" xmlns:r="http://schemas.openxmlformats.org/officeDocument/2006/relationships" xmlns:p="http://schemas.openxmlformats.org/presentationml/2006/main">
+  <p:cSld>
+    <p:spTree>
+      <p:nvGrpSpPr>
+        <p:cNvPr id="1" name=""/>
+        <p:cNvGrpSpPr/>
+        <p:nvPr/>
+      </p:nvGrpSpPr>
+      <p:grpSpPr>
+        <a:xfrm>
+          <a:off x="0" y="0"/>
+          <a:ext cx="0" cy="0"/>
+          <a:chOff x="0" y="0"/>
+          <a:chExt cx="0" cy="0"/>
+        </a:xfrm>
+      </p:grpSpPr>
+      <p:sp>
+        <p:nvSpPr>
+          <p:cNvPr id="2" name="Espaço Reservado para Imagem de Slide 1"/>
+          <p:cNvSpPr>
+            <a:spLocks noGrp="1" noRot="1" noChangeAspect="1"/>
+          </p:cNvSpPr>
+          <p:nvPr>
+            <p:ph type="sldImg"/>
+          </p:nvPr>
+        </p:nvSpPr>
+        <p:spPr/>
+      </p:sp>
+      <p:sp>
+        <p:nvSpPr>
+          <p:cNvPr id="3" name="Espaço Reservado para Anotações 2"/>
+          <p:cNvSpPr>
+            <a:spLocks noGrp="1"/>
+          </p:cNvSpPr>
+          <p:nvPr>
+            <p:ph type="body" idx="1"/>
+          </p:nvPr>
+        </p:nvSpPr>
+        <p:spPr/>
+        <p:txBody>
+          <a:bodyPr/>
+          <a:lstStyle/>
+          <a:p>
+            <a:r>
+              <a:rPr lang="pt-BR" dirty="0"/>
+              <a:t>R2 Score – Leva em consideração a quantidade de amostras (N) e (p) a quantidade de dados de entrada do modelo para remover o viés de otimização.</a:t>
+            </a:r>
+          </a:p>
+          <a:p>
+            <a:endParaRPr lang="pt-BR" dirty="0"/>
+          </a:p>
+          <a:p>
+            <a:r>
+              <a:rPr lang="pt-BR" dirty="0"/>
+              <a:t>O MAE é a mesma coisa que o MSE, a diferença é que não pune os dados muito discrepantes. É usado para medir dados </a:t>
+            </a:r>
+            <a:r>
+              <a:rPr lang="pt-BR" dirty="0" err="1"/>
+              <a:t>sazionais</a:t>
+            </a:r>
+            <a:r>
+              <a:rPr lang="pt-BR" dirty="0"/>
+              <a:t>, como surtos de gripe.</a:t>
+            </a:r>
+          </a:p>
+        </p:txBody>
+      </p:sp>
+      <p:sp>
+        <p:nvSpPr>
+          <p:cNvPr id="4" name="Espaço Reservado para Número de Slide 3"/>
+          <p:cNvSpPr>
+            <a:spLocks noGrp="1"/>
+          </p:cNvSpPr>
+          <p:nvPr>
+            <p:ph type="sldNum" sz="quarter" idx="5"/>
+          </p:nvPr>
+        </p:nvSpPr>
+        <p:spPr/>
+        <p:txBody>
+          <a:bodyPr/>
+          <a:lstStyle/>
+          <a:p>
+            <a:fld id="{FD0942CD-4DA8-49D4-9C3A-BA5FFA832728}" type="slidenum">
+              <a:rPr lang="pt-BR" smtClean="0"/>
+              <a:pPr/>
+              <a:t>12</a:t>
             </a:fld>
             <a:endParaRPr lang="pt-BR"/>
           </a:p>
@@ -1566,7 +1631,7 @@
           <a:p>
             <a:fld id="{1787AD07-0C2A-424C-83EF-FCCF4A0D3BA0}" type="datetime1">
               <a:rPr lang="pt-BR" smtClean="0"/>
-              <a:t>06/03/2023</a:t>
+              <a:t>09/03/2023</a:t>
             </a:fld>
             <a:endParaRPr lang="pt-BR"/>
           </a:p>
@@ -1735,7 +1800,7 @@
           <a:p>
             <a:fld id="{2F92FB66-59C8-46A5-AD82-5DAAFD2DC390}" type="datetime1">
               <a:rPr lang="pt-BR" smtClean="0"/>
-              <a:t>06/03/2023</a:t>
+              <a:t>09/03/2023</a:t>
             </a:fld>
             <a:endParaRPr lang="pt-BR"/>
           </a:p>
@@ -1914,7 +1979,7 @@
           <a:p>
             <a:fld id="{3D5CC8D2-C61E-4471-AD68-1C0D45A8EAFC}" type="datetime1">
               <a:rPr lang="pt-BR" smtClean="0"/>
-              <a:t>06/03/2023</a:t>
+              <a:t>09/03/2023</a:t>
             </a:fld>
             <a:endParaRPr lang="pt-BR"/>
           </a:p>
@@ -2057,7 +2122,7 @@
           <a:p>
             <a:fld id="{C3E38981-C08A-4A29-B885-392FB4EE0709}" type="datetime1">
               <a:rPr lang="pt-BR" smtClean="0"/>
-              <a:t>06/03/2023</a:t>
+              <a:t>09/03/2023</a:t>
             </a:fld>
             <a:endParaRPr lang="en-US" dirty="0"/>
           </a:p>
@@ -2442,7 +2507,7 @@
           <a:p>
             <a:fld id="{2CFE63D7-5B4A-40A4-8FD4-EA63D1010EB7}" type="datetime1">
               <a:rPr lang="pt-BR" smtClean="0"/>
-              <a:t>06/03/2023</a:t>
+              <a:t>09/03/2023</a:t>
             </a:fld>
             <a:endParaRPr lang="en-US" dirty="0"/>
           </a:p>
@@ -2664,7 +2729,7 @@
           <a:p>
             <a:fld id="{A9719147-5557-4D76-A2C3-BF25882771D2}" type="datetime1">
               <a:rPr lang="pt-BR" smtClean="0"/>
-              <a:t>06/03/2023</a:t>
+              <a:t>09/03/2023</a:t>
             </a:fld>
             <a:endParaRPr lang="en-US" dirty="0"/>
           </a:p>
@@ -2977,7 +3042,7 @@
           <a:p>
             <a:fld id="{66250340-7104-44A8-88A9-88532CCE9C1C}" type="datetime1">
               <a:rPr lang="pt-BR" smtClean="0"/>
-              <a:t>06/03/2023</a:t>
+              <a:t>09/03/2023</a:t>
             </a:fld>
             <a:endParaRPr lang="en-US" dirty="0"/>
           </a:p>
@@ -3162,7 +3227,7 @@
           <a:p>
             <a:fld id="{D047EA32-7810-48BE-A9BB-EA3D8AA5AD34}" type="datetime1">
               <a:rPr lang="pt-BR" smtClean="0"/>
-              <a:t>06/03/2023</a:t>
+              <a:t>09/03/2023</a:t>
             </a:fld>
             <a:endParaRPr lang="en-US" dirty="0"/>
           </a:p>
@@ -3310,7 +3375,7 @@
           <a:p>
             <a:fld id="{7C28E9E9-B91F-400E-BE43-87BB4B5C6F4E}" type="datetime1">
               <a:rPr lang="pt-BR" smtClean="0"/>
-              <a:t>06/03/2023</a:t>
+              <a:t>09/03/2023</a:t>
             </a:fld>
             <a:endParaRPr lang="en-US" dirty="0"/>
           </a:p>
@@ -3562,7 +3627,7 @@
           <a:p>
             <a:fld id="{A9E773EA-BFD5-41D4-8CCD-2C9F67DAB481}" type="datetime1">
               <a:rPr lang="pt-BR" smtClean="0"/>
-              <a:t>06/03/2023</a:t>
+              <a:t>09/03/2023</a:t>
             </a:fld>
             <a:endParaRPr lang="pt-BR" dirty="0"/>
           </a:p>
@@ -3764,7 +3829,7 @@
           <a:p>
             <a:fld id="{DAA7C8B6-CF57-4A95-AF6C-A77E6C230ED3}" type="datetime1">
               <a:rPr lang="pt-BR" smtClean="0"/>
-              <a:t>06/03/2023</a:t>
+              <a:t>09/03/2023</a:t>
             </a:fld>
             <a:endParaRPr lang="pt-BR"/>
           </a:p>
@@ -4048,7 +4113,7 @@
           <a:p>
             <a:fld id="{34D50989-24C8-4023-9B0D-A6D249548FD9}" type="datetime1">
               <a:rPr lang="pt-BR" smtClean="0"/>
-              <a:t>06/03/2023</a:t>
+              <a:t>09/03/2023</a:t>
             </a:fld>
             <a:endParaRPr lang="pt-BR"/>
           </a:p>
@@ -4284,7 +4349,7 @@
           <a:p>
             <a:fld id="{8D9BC96A-9776-4585-A439-BC9E2DA226C1}" type="datetime1">
               <a:rPr lang="pt-BR" smtClean="0"/>
-              <a:t>06/03/2023</a:t>
+              <a:t>09/03/2023</a:t>
             </a:fld>
             <a:endParaRPr lang="pt-BR"/>
           </a:p>
@@ -4667,7 +4732,7 @@
           <a:p>
             <a:fld id="{7D12BE36-2922-4567-BD67-201EFA21BF6D}" type="datetime1">
               <a:rPr lang="pt-BR" smtClean="0"/>
-              <a:t>06/03/2023</a:t>
+              <a:t>09/03/2023</a:t>
             </a:fld>
             <a:endParaRPr lang="pt-BR"/>
           </a:p>
@@ -4779,7 +4844,7 @@
           <a:p>
             <a:fld id="{E5B462A9-4B1E-4013-BFB1-FC92225AC2F2}" type="datetime1">
               <a:rPr lang="pt-BR" smtClean="0"/>
-              <a:t>06/03/2023</a:t>
+              <a:t>09/03/2023</a:t>
             </a:fld>
             <a:endParaRPr lang="pt-BR"/>
           </a:p>
@@ -4863,7 +4928,7 @@
           <a:p>
             <a:fld id="{D0E6EC7A-67E7-4978-9BAE-C8F82A40B13B}" type="datetime1">
               <a:rPr lang="pt-BR" smtClean="0"/>
-              <a:t>06/03/2023</a:t>
+              <a:t>09/03/2023</a:t>
             </a:fld>
             <a:endParaRPr lang="pt-BR"/>
           </a:p>
@@ -5145,7 +5210,7 @@
           <a:p>
             <a:fld id="{6E085A4E-80B8-47DD-9D9B-8E1B205CBB30}" type="datetime1">
               <a:rPr lang="pt-BR" smtClean="0"/>
-              <a:t>06/03/2023</a:t>
+              <a:t>09/03/2023</a:t>
             </a:fld>
             <a:endParaRPr lang="pt-BR"/>
           </a:p>
@@ -5404,7 +5469,7 @@
           <a:p>
             <a:fld id="{F4E9A02C-D9AD-4B8C-9B93-B0980E8E86EB}" type="datetime1">
               <a:rPr lang="pt-BR" smtClean="0"/>
-              <a:t>06/03/2023</a:t>
+              <a:t>09/03/2023</a:t>
             </a:fld>
             <a:endParaRPr lang="pt-BR"/>
           </a:p>
@@ -5616,7 +5681,7 @@
           <a:p>
             <a:fld id="{202762D0-3A59-4B14-83BA-8E0FC8A60AB1}" type="datetime1">
               <a:rPr lang="pt-BR" smtClean="0"/>
-              <a:t>06/03/2023</a:t>
+              <a:t>09/03/2023</a:t>
             </a:fld>
             <a:endParaRPr lang="pt-BR"/>
           </a:p>
@@ -6489,6 +6554,295 @@
         <p:spPr>
           <a:xfrm>
             <a:off x="228600" y="133350"/>
+            <a:ext cx="6324600" cy="707886"/>
+          </a:xfrm>
+          <a:prstGeom prst="rect">
+            <a:avLst/>
+          </a:prstGeom>
+          <a:noFill/>
+        </p:spPr>
+        <p:txBody>
+          <a:bodyPr wrap="square" rtlCol="0">
+            <a:spAutoFit/>
+          </a:bodyPr>
+          <a:lstStyle/>
+          <a:p>
+            <a:r>
+              <a:rPr lang="pt-BR" sz="4000" dirty="0">
+                <a:solidFill>
+                  <a:srgbClr val="ED145B"/>
+                </a:solidFill>
+                <a:latin typeface="Gotham HTF" pitchFamily="50" charset="0"/>
+                <a:cs typeface="Gotham HTF Light"/>
+              </a:rPr>
+              <a:t>Matriz de correlação</a:t>
+            </a:r>
+          </a:p>
+        </p:txBody>
+      </p:sp>
+      <p:pic>
+        <p:nvPicPr>
+          <p:cNvPr id="5" name="Imagem 4">
+            <a:extLst>
+              <a:ext uri="{FF2B5EF4-FFF2-40B4-BE49-F238E27FC236}">
+                <a16:creationId xmlns:a16="http://schemas.microsoft.com/office/drawing/2014/main" id="{B1599C92-9214-845A-5A04-314742E294BB}"/>
+              </a:ext>
+            </a:extLst>
+          </p:cNvPr>
+          <p:cNvPicPr>
+            <a:picLocks noChangeAspect="1"/>
+          </p:cNvPicPr>
+          <p:nvPr/>
+        </p:nvPicPr>
+        <p:blipFill>
+          <a:blip r:embed="rId2"/>
+          <a:stretch>
+            <a:fillRect/>
+          </a:stretch>
+        </p:blipFill>
+        <p:spPr>
+          <a:xfrm>
+            <a:off x="179512" y="1570831"/>
+            <a:ext cx="5248275" cy="4162425"/>
+          </a:xfrm>
+          <a:prstGeom prst="rect">
+            <a:avLst/>
+          </a:prstGeom>
+        </p:spPr>
+      </p:pic>
+      <p:sp>
+        <p:nvSpPr>
+          <p:cNvPr id="6" name="CaixaDeTexto 5">
+            <a:extLst>
+              <a:ext uri="{FF2B5EF4-FFF2-40B4-BE49-F238E27FC236}">
+                <a16:creationId xmlns:a16="http://schemas.microsoft.com/office/drawing/2014/main" id="{575070AD-F618-89D8-61C5-E4342FE12DB7}"/>
+              </a:ext>
+            </a:extLst>
+          </p:cNvPr>
+          <p:cNvSpPr txBox="1"/>
+          <p:nvPr/>
+        </p:nvSpPr>
+        <p:spPr>
+          <a:xfrm>
+            <a:off x="4572000" y="1268760"/>
+            <a:ext cx="4248472" cy="4204356"/>
+          </a:xfrm>
+          <a:prstGeom prst="rect">
+            <a:avLst/>
+          </a:prstGeom>
+          <a:noFill/>
+        </p:spPr>
+        <p:txBody>
+          <a:bodyPr wrap="square">
+            <a:spAutoFit/>
+          </a:bodyPr>
+          <a:lstStyle/>
+          <a:p>
+            <a:pPr marL="800100" lvl="1" indent="-342900">
+              <a:lnSpc>
+                <a:spcPct val="150000"/>
+              </a:lnSpc>
+              <a:buClr>
+                <a:srgbClr val="ED265B"/>
+              </a:buClr>
+              <a:buFont typeface="Wingdings" panose="05000000000000000000" pitchFamily="2" charset="2"/>
+              <a:buChar char="Ø"/>
+            </a:pPr>
+            <a:r>
+              <a:rPr lang="pt-BR" dirty="0">
+                <a:latin typeface="Gotham HTF"/>
+              </a:rPr>
+              <a:t>a matriz de correlação é uma ferramenta utilizada na análise exploratória de dados, pois ajuda a identificar as relações mais fortes e mais fracas entre as variáveis. </a:t>
+            </a:r>
+          </a:p>
+          <a:p>
+            <a:pPr marL="800100" lvl="1" indent="-342900">
+              <a:lnSpc>
+                <a:spcPct val="150000"/>
+              </a:lnSpc>
+              <a:buClr>
+                <a:srgbClr val="ED265B"/>
+              </a:buClr>
+              <a:buFont typeface="Wingdings" panose="05000000000000000000" pitchFamily="2" charset="2"/>
+              <a:buChar char="Ø"/>
+            </a:pPr>
+            <a:endParaRPr lang="pt-BR" dirty="0">
+              <a:latin typeface="Gotham HTF"/>
+            </a:endParaRPr>
+          </a:p>
+          <a:p>
+            <a:pPr marL="800100" lvl="1" indent="-342900">
+              <a:lnSpc>
+                <a:spcPct val="150000"/>
+              </a:lnSpc>
+              <a:buClr>
+                <a:srgbClr val="ED265B"/>
+              </a:buClr>
+              <a:buFont typeface="Wingdings" panose="05000000000000000000" pitchFamily="2" charset="2"/>
+              <a:buChar char="Ø"/>
+            </a:pPr>
+            <a:r>
+              <a:rPr lang="pt-BR" dirty="0">
+                <a:latin typeface="Gotham HTF"/>
+              </a:rPr>
+              <a:t>Pode ser usada para selecionar as variáveis mais importantes para a modelagem e pode ajudar a evitar problemas de </a:t>
+            </a:r>
+            <a:r>
+              <a:rPr lang="pt-BR" dirty="0" err="1">
+                <a:latin typeface="Gotham HTF"/>
+              </a:rPr>
+              <a:t>multicolinearidade</a:t>
+            </a:r>
+            <a:endParaRPr lang="en-US" sz="1400" dirty="0">
+              <a:latin typeface="Gotham HTF"/>
+              <a:cs typeface="Gotham HTF Light"/>
+            </a:endParaRPr>
+          </a:p>
+        </p:txBody>
+      </p:sp>
+    </p:spTree>
+    <p:extLst>
+      <p:ext uri="{BB962C8B-B14F-4D97-AF65-F5344CB8AC3E}">
+        <p14:creationId xmlns:p14="http://schemas.microsoft.com/office/powerpoint/2010/main" val="182877950"/>
+      </p:ext>
+    </p:extLst>
+  </p:cSld>
+  <p:clrMapOvr>
+    <a:masterClrMapping/>
+  </p:clrMapOvr>
+  <mc:AlternateContent xmlns:mc="http://schemas.openxmlformats.org/markup-compatibility/2006" xmlns:p14="http://schemas.microsoft.com/office/powerpoint/2010/main">
+    <mc:Choice Requires="p14">
+      <p:transition spd="med" p14:dur="700">
+        <p:fade/>
+      </p:transition>
+    </mc:Choice>
+    <mc:Fallback xmlns="">
+      <p:transition spd="med">
+        <p:fade/>
+      </p:transition>
+    </mc:Fallback>
+  </mc:AlternateContent>
+  <p:timing>
+    <p:tnLst>
+      <p:par>
+        <p:cTn id="1" dur="indefinite" restart="never" nodeType="tmRoot">
+          <p:childTnLst>
+            <p:seq concurrent="1" nextAc="seek">
+              <p:cTn id="2" dur="indefinite" nodeType="mainSeq">
+                <p:childTnLst>
+                  <p:par>
+                    <p:cTn id="3" fill="hold">
+                      <p:stCondLst>
+                        <p:cond delay="indefinite"/>
+                      </p:stCondLst>
+                      <p:childTnLst>
+                        <p:par>
+                          <p:cTn id="4" fill="hold">
+                            <p:stCondLst>
+                              <p:cond delay="0"/>
+                            </p:stCondLst>
+                            <p:childTnLst>
+                              <p:par>
+                                <p:cTn id="5" presetID="10" presetClass="entr" presetSubtype="0" fill="hold" grpId="0" nodeType="clickEffect">
+                                  <p:stCondLst>
+                                    <p:cond delay="0"/>
+                                  </p:stCondLst>
+                                  <p:childTnLst>
+                                    <p:set>
+                                      <p:cBhvr>
+                                        <p:cTn id="6" dur="1" fill="hold">
+                                          <p:stCondLst>
+                                            <p:cond delay="0"/>
+                                          </p:stCondLst>
+                                        </p:cTn>
+                                        <p:tgtEl>
+                                          <p:spTgt spid="6"/>
+                                        </p:tgtEl>
+                                        <p:attrNameLst>
+                                          <p:attrName>style.visibility</p:attrName>
+                                        </p:attrNameLst>
+                                      </p:cBhvr>
+                                      <p:to>
+                                        <p:strVal val="visible"/>
+                                      </p:to>
+                                    </p:set>
+                                    <p:animEffect transition="in" filter="fade">
+                                      <p:cBhvr>
+                                        <p:cTn id="7" dur="500"/>
+                                        <p:tgtEl>
+                                          <p:spTgt spid="6"/>
+                                        </p:tgtEl>
+                                      </p:cBhvr>
+                                    </p:animEffect>
+                                  </p:childTnLst>
+                                </p:cTn>
+                              </p:par>
+                            </p:childTnLst>
+                          </p:cTn>
+                        </p:par>
+                      </p:childTnLst>
+                    </p:cTn>
+                  </p:par>
+                </p:childTnLst>
+              </p:cTn>
+              <p:prevCondLst>
+                <p:cond evt="onPrev" delay="0">
+                  <p:tgtEl>
+                    <p:sldTgt/>
+                  </p:tgtEl>
+                </p:cond>
+              </p:prevCondLst>
+              <p:nextCondLst>
+                <p:cond evt="onNext" delay="0">
+                  <p:tgtEl>
+                    <p:sldTgt/>
+                  </p:tgtEl>
+                </p:cond>
+              </p:nextCondLst>
+            </p:seq>
+          </p:childTnLst>
+        </p:cTn>
+      </p:par>
+    </p:tnLst>
+    <p:bldLst>
+      <p:bldP spid="6" grpId="0"/>
+    </p:bldLst>
+  </p:timing>
+</p:sld>
+</file>
+
+<file path=ppt/slides/slide11.xml><?xml version="1.0" encoding="utf-8"?>
+<p:sld xmlns:a="http://schemas.openxmlformats.org/drawingml/2006/main" xmlns:r="http://schemas.openxmlformats.org/officeDocument/2006/relationships" xmlns:p="http://schemas.openxmlformats.org/presentationml/2006/main">
+  <p:cSld>
+    <p:spTree>
+      <p:nvGrpSpPr>
+        <p:cNvPr id="1" name=""/>
+        <p:cNvGrpSpPr/>
+        <p:nvPr/>
+      </p:nvGrpSpPr>
+      <p:grpSpPr>
+        <a:xfrm>
+          <a:off x="0" y="0"/>
+          <a:ext cx="0" cy="0"/>
+          <a:chOff x="0" y="0"/>
+          <a:chExt cx="0" cy="0"/>
+        </a:xfrm>
+      </p:grpSpPr>
+      <p:sp>
+        <p:nvSpPr>
+          <p:cNvPr id="9" name="TextBox 6">
+            <a:extLst>
+              <a:ext uri="{FF2B5EF4-FFF2-40B4-BE49-F238E27FC236}">
+                <a16:creationId xmlns:a16="http://schemas.microsoft.com/office/drawing/2014/main" id="{225765AD-71F7-DC36-6CE8-E9873BEE1F3F}"/>
+              </a:ext>
+            </a:extLst>
+          </p:cNvPr>
+          <p:cNvSpPr txBox="1"/>
+          <p:nvPr/>
+        </p:nvSpPr>
+        <p:spPr>
+          <a:xfrm>
+            <a:off x="228600" y="133350"/>
             <a:ext cx="6324600" cy="1323439"/>
           </a:xfrm>
           <a:prstGeom prst="rect">
@@ -7565,7 +7919,7 @@
 </p:sld>
 </file>
 
-<file path=ppt/slides/slide11.xml><?xml version="1.0" encoding="utf-8"?>
+<file path=ppt/slides/slide12.xml><?xml version="1.0" encoding="utf-8"?>
 <p:sld xmlns:a="http://schemas.openxmlformats.org/drawingml/2006/main" xmlns:r="http://schemas.openxmlformats.org/officeDocument/2006/relationships" xmlns:p="http://schemas.openxmlformats.org/presentationml/2006/main">
   <p:cSld>
     <p:spTree>
@@ -8348,7 +8702,7 @@
 </p:sld>
 </file>
 
-<file path=ppt/slides/slide12.xml><?xml version="1.0" encoding="utf-8"?>
+<file path=ppt/slides/slide13.xml><?xml version="1.0" encoding="utf-8"?>
 <p:sld xmlns:a="http://schemas.openxmlformats.org/drawingml/2006/main" xmlns:r="http://schemas.openxmlformats.org/officeDocument/2006/relationships" xmlns:p="http://schemas.openxmlformats.org/presentationml/2006/main">
   <p:cSld>
     <p:spTree>
@@ -8533,7 +8887,7 @@
             <a:fld id="{3F951EF7-2A75-44A0-8045-6A6595E5FF16}" type="slidenum">
               <a:rPr lang="pt-BR" smtClean="0"/>
               <a:pPr/>
-              <a:t>12</a:t>
+              <a:t>13</a:t>
             </a:fld>
             <a:endParaRPr lang="pt-BR" dirty="0"/>
           </a:p>
@@ -13993,31 +14347,17 @@
                 <a:latin typeface="Gotham HTF Light"/>
                 <a:cs typeface="Gotham HTF Light"/>
               </a:rPr>
-              <a:t>Outros </a:t>
-            </a:r>
-            <a:r>
-              <a:rPr lang="en-US" sz="2400" dirty="0" err="1">
-                <a:latin typeface="Gotham HTF Light"/>
-                <a:cs typeface="Gotham HTF Light"/>
-              </a:rPr>
-              <a:t>algoritmos</a:t>
-            </a:r>
-            <a:r>
-              <a:rPr lang="en-US" sz="2400" dirty="0">
-                <a:latin typeface="Gotham HTF Light"/>
-                <a:cs typeface="Gotham HTF Light"/>
-              </a:rPr>
-              <a:t>:</a:t>
+              <a:t>Support Vector Machine</a:t>
             </a:r>
           </a:p>
         </p:txBody>
       </p:sp>
       <p:sp>
         <p:nvSpPr>
-          <p:cNvPr id="4" name="CaixaDeTexto 3">
+          <p:cNvPr id="6" name="CaixaDeTexto 5">
             <a:extLst>
               <a:ext uri="{FF2B5EF4-FFF2-40B4-BE49-F238E27FC236}">
-                <a16:creationId xmlns:a16="http://schemas.microsoft.com/office/drawing/2014/main" id="{6E6A2C93-2192-1C53-226A-DADC5BC86945}"/>
+                <a16:creationId xmlns:a16="http://schemas.microsoft.com/office/drawing/2014/main" id="{63091C20-C88A-F5B9-D3EA-7D8C0C6AE04C}"/>
               </a:ext>
             </a:extLst>
           </p:cNvPr>
@@ -14026,8 +14366,8 @@
         </p:nvSpPr>
         <p:spPr>
           <a:xfrm>
-            <a:off x="251520" y="1629076"/>
-            <a:ext cx="8496944" cy="2126864"/>
+            <a:off x="251520" y="1556792"/>
+            <a:ext cx="7704856" cy="894732"/>
           </a:xfrm>
           <a:prstGeom prst="rect">
             <a:avLst/>
@@ -14051,136 +14391,106 @@
               <a:buChar char="Ø"/>
             </a:pPr>
             <a:r>
-              <a:rPr lang="pt-BR" dirty="0">
-                <a:latin typeface="Gotham HTF"/>
-              </a:rPr>
-              <a:t>Árvores de regressão;</a:t>
-            </a:r>
-          </a:p>
-          <a:p>
-            <a:pPr marL="800100" lvl="1" indent="-342900">
-              <a:lnSpc>
-                <a:spcPct val="150000"/>
-              </a:lnSpc>
-              <a:buClr>
-                <a:srgbClr val="ED265B"/>
-              </a:buClr>
-              <a:buFont typeface="Wingdings" panose="05000000000000000000" pitchFamily="2" charset="2"/>
-              <a:buChar char="Ø"/>
-            </a:pPr>
-            <a:r>
-              <a:rPr lang="pt-BR" dirty="0" err="1">
-                <a:latin typeface="Gotham HTF"/>
-                <a:cs typeface="Gotham HTF Light"/>
-              </a:rPr>
-              <a:t>Support</a:t>
-            </a:r>
-            <a:r>
-              <a:rPr lang="pt-BR" dirty="0">
-                <a:latin typeface="Gotham HTF"/>
-                <a:cs typeface="Gotham HTF Light"/>
-              </a:rPr>
-              <a:t> Vector </a:t>
-            </a:r>
-            <a:r>
-              <a:rPr lang="pt-BR" dirty="0" err="1">
-                <a:latin typeface="Gotham HTF"/>
-                <a:cs typeface="Gotham HTF Light"/>
-              </a:rPr>
-              <a:t>Machine</a:t>
-            </a:r>
-            <a:r>
-              <a:rPr lang="pt-BR" dirty="0">
-                <a:latin typeface="Gotham HTF"/>
-                <a:cs typeface="Gotham HTF Light"/>
-              </a:rPr>
-              <a:t>;</a:t>
-            </a:r>
-          </a:p>
-          <a:p>
-            <a:pPr marL="800100" lvl="1" indent="-342900">
-              <a:lnSpc>
-                <a:spcPct val="150000"/>
-              </a:lnSpc>
-              <a:buClr>
-                <a:srgbClr val="ED265B"/>
-              </a:buClr>
-              <a:buFont typeface="Wingdings" panose="05000000000000000000" pitchFamily="2" charset="2"/>
-              <a:buChar char="Ø"/>
-            </a:pPr>
-            <a:r>
-              <a:rPr lang="pt-BR" dirty="0">
-                <a:latin typeface="Gotham HTF"/>
-                <a:cs typeface="Gotham HTF Light"/>
-              </a:rPr>
-              <a:t>Random Forest;</a:t>
-            </a:r>
-          </a:p>
-          <a:p>
-            <a:pPr marL="800100" lvl="1" indent="-342900">
-              <a:lnSpc>
-                <a:spcPct val="150000"/>
-              </a:lnSpc>
-              <a:buClr>
-                <a:srgbClr val="ED265B"/>
-              </a:buClr>
-              <a:buFont typeface="Wingdings" panose="05000000000000000000" pitchFamily="2" charset="2"/>
-              <a:buChar char="Ø"/>
-            </a:pPr>
-            <a:r>
-              <a:rPr lang="pt-BR" dirty="0" err="1">
-                <a:latin typeface="Gotham HTF"/>
-                <a:cs typeface="Gotham HTF Light"/>
-              </a:rPr>
-              <a:t>Gradient</a:t>
-            </a:r>
-            <a:r>
-              <a:rPr lang="pt-BR" dirty="0">
-                <a:latin typeface="Gotham HTF"/>
-                <a:cs typeface="Gotham HTF Light"/>
-              </a:rPr>
-              <a:t> </a:t>
-            </a:r>
-            <a:r>
-              <a:rPr lang="pt-BR" dirty="0" err="1">
-                <a:latin typeface="Gotham HTF"/>
-                <a:cs typeface="Gotham HTF Light"/>
-              </a:rPr>
-              <a:t>Boost</a:t>
-            </a:r>
-            <a:r>
-              <a:rPr lang="pt-BR" dirty="0">
-                <a:latin typeface="Gotham HTF"/>
-                <a:cs typeface="Gotham HTF Light"/>
-              </a:rPr>
-              <a:t>;</a:t>
-            </a:r>
-          </a:p>
-          <a:p>
-            <a:pPr marL="800100" lvl="1" indent="-342900">
-              <a:lnSpc>
-                <a:spcPct val="150000"/>
-              </a:lnSpc>
-              <a:buClr>
-                <a:srgbClr val="ED265B"/>
-              </a:buClr>
-              <a:buFont typeface="Wingdings" panose="05000000000000000000" pitchFamily="2" charset="2"/>
-              <a:buChar char="Ø"/>
-            </a:pPr>
-            <a:r>
-              <a:rPr lang="pt-BR" dirty="0">
-                <a:latin typeface="Gotham HTF"/>
-                <a:cs typeface="Gotham HTF Light"/>
-              </a:rPr>
-              <a:t>KNN;</a:t>
-            </a:r>
-            <a:endParaRPr lang="en-US" dirty="0">
+              <a:rPr lang="pt-BR" sz="1200" dirty="0"/>
+              <a:t>Pode ser usado tanto para classificação, quanto para regressão. Ele pega os dados e traça uma divisão entre eles, considerando a inclinação que dá a maior distância entre os grupos, mas ao mesmo tempo, a menor distancia entre os pontos da reta</a:t>
+            </a:r>
+            <a:endParaRPr lang="pt-BR" sz="1200" dirty="0">
               <a:latin typeface="Gotham HTF"/>
               <a:cs typeface="Gotham HTF Light"/>
             </a:endParaRPr>
           </a:p>
         </p:txBody>
       </p:sp>
+      <p:pic>
+        <p:nvPicPr>
+          <p:cNvPr id="8" name="Imagem 7">
+            <a:extLst>
+              <a:ext uri="{FF2B5EF4-FFF2-40B4-BE49-F238E27FC236}">
+                <a16:creationId xmlns:a16="http://schemas.microsoft.com/office/drawing/2014/main" id="{F0743F72-7990-B511-2212-C1EB6425FD89}"/>
+              </a:ext>
+            </a:extLst>
+          </p:cNvPr>
+          <p:cNvPicPr>
+            <a:picLocks noChangeAspect="1"/>
+          </p:cNvPicPr>
+          <p:nvPr/>
+        </p:nvPicPr>
+        <p:blipFill>
+          <a:blip r:embed="rId3"/>
+          <a:stretch>
+            <a:fillRect/>
+          </a:stretch>
+        </p:blipFill>
+        <p:spPr>
+          <a:xfrm>
+            <a:off x="228600" y="3132534"/>
+            <a:ext cx="2752281" cy="2187920"/>
+          </a:xfrm>
+          <a:prstGeom prst="rect">
+            <a:avLst/>
+          </a:prstGeom>
+        </p:spPr>
+      </p:pic>
+      <p:pic>
+        <p:nvPicPr>
+          <p:cNvPr id="11" name="Imagem 10">
+            <a:extLst>
+              <a:ext uri="{FF2B5EF4-FFF2-40B4-BE49-F238E27FC236}">
+                <a16:creationId xmlns:a16="http://schemas.microsoft.com/office/drawing/2014/main" id="{47503EFB-F80D-3E25-561A-6ECA6BA9E237}"/>
+              </a:ext>
+            </a:extLst>
+          </p:cNvPr>
+          <p:cNvPicPr>
+            <a:picLocks noChangeAspect="1"/>
+          </p:cNvPicPr>
+          <p:nvPr/>
+        </p:nvPicPr>
+        <p:blipFill>
+          <a:blip r:embed="rId4"/>
+          <a:stretch>
+            <a:fillRect/>
+          </a:stretch>
+        </p:blipFill>
+        <p:spPr>
+          <a:xfrm>
+            <a:off x="3160299" y="2703148"/>
+            <a:ext cx="2563829" cy="2598059"/>
+          </a:xfrm>
+          <a:prstGeom prst="rect">
+            <a:avLst/>
+          </a:prstGeom>
+        </p:spPr>
+      </p:pic>
+      <p:pic>
+        <p:nvPicPr>
+          <p:cNvPr id="13" name="Imagem 12">
+            <a:extLst>
+              <a:ext uri="{FF2B5EF4-FFF2-40B4-BE49-F238E27FC236}">
+                <a16:creationId xmlns:a16="http://schemas.microsoft.com/office/drawing/2014/main" id="{57332A00-B91B-7406-6785-E6880865E814}"/>
+              </a:ext>
+            </a:extLst>
+          </p:cNvPr>
+          <p:cNvPicPr>
+            <a:picLocks noChangeAspect="1"/>
+          </p:cNvPicPr>
+          <p:nvPr/>
+        </p:nvPicPr>
+        <p:blipFill>
+          <a:blip r:embed="rId5"/>
+          <a:stretch>
+            <a:fillRect/>
+          </a:stretch>
+        </p:blipFill>
+        <p:spPr>
+          <a:xfrm>
+            <a:off x="6163121" y="3132534"/>
+            <a:ext cx="2801367" cy="2094373"/>
+          </a:xfrm>
+          <a:prstGeom prst="rect">
+            <a:avLst/>
+          </a:prstGeom>
+        </p:spPr>
+      </p:pic>
     </p:spTree>
     <p:extLst>
       <p:ext uri="{BB962C8B-B14F-4D97-AF65-F5344CB8AC3E}">
@@ -14290,7 +14600,7 @@
                                           </p:stCondLst>
                                         </p:cTn>
                                         <p:tgtEl>
-                                          <p:spTgt spid="4"/>
+                                          <p:spTgt spid="6"/>
                                         </p:tgtEl>
                                         <p:attrNameLst>
                                           <p:attrName>style.visibility</p:attrName>
@@ -14304,7 +14614,7 @@
                                       <p:cBhvr>
                                         <p:cTn id="12" dur="500"/>
                                         <p:tgtEl>
-                                          <p:spTgt spid="4"/>
+                                          <p:spTgt spid="6"/>
                                         </p:tgtEl>
                                       </p:cBhvr>
                                     </p:animEffect>
@@ -14340,7 +14650,7 @@
     </p:tnLst>
     <p:bldLst>
       <p:bldP spid="3" grpId="0"/>
-      <p:bldP spid="4" grpId="0"/>
+      <p:bldP spid="6" grpId="0"/>
     </p:bldLst>
   </p:timing>
 </p:sld>
@@ -14391,6 +14701,7 @@
           </a:bodyPr>
           <a:lstStyle/>
           <a:p>
+            <a:pPr algn="r"/>
             <a:r>
               <a:rPr lang="pt-BR" sz="4000" dirty="0">
                 <a:solidFill>
@@ -14399,47 +14710,17 @@
                 <a:latin typeface="Gotham HTF" pitchFamily="50" charset="0"/>
                 <a:cs typeface="Gotham HTF Light"/>
               </a:rPr>
-              <a:t>Matriz de correlação</a:t>
+              <a:t>Algoritmos de Regressão</a:t>
             </a:r>
           </a:p>
         </p:txBody>
       </p:sp>
-      <p:pic>
-        <p:nvPicPr>
-          <p:cNvPr id="5" name="Imagem 4">
+      <p:sp>
+        <p:nvSpPr>
+          <p:cNvPr id="3" name="CaixaDeTexto 2">
             <a:extLst>
               <a:ext uri="{FF2B5EF4-FFF2-40B4-BE49-F238E27FC236}">
-                <a16:creationId xmlns:a16="http://schemas.microsoft.com/office/drawing/2014/main" id="{B1599C92-9214-845A-5A04-314742E294BB}"/>
-              </a:ext>
-            </a:extLst>
-          </p:cNvPr>
-          <p:cNvPicPr>
-            <a:picLocks noChangeAspect="1"/>
-          </p:cNvPicPr>
-          <p:nvPr/>
-        </p:nvPicPr>
-        <p:blipFill>
-          <a:blip r:embed="rId2"/>
-          <a:stretch>
-            <a:fillRect/>
-          </a:stretch>
-        </p:blipFill>
-        <p:spPr>
-          <a:xfrm>
-            <a:off x="179512" y="1570831"/>
-            <a:ext cx="5248275" cy="4162425"/>
-          </a:xfrm>
-          <a:prstGeom prst="rect">
-            <a:avLst/>
-          </a:prstGeom>
-        </p:spPr>
-      </p:pic>
-      <p:sp>
-        <p:nvSpPr>
-          <p:cNvPr id="6" name="CaixaDeTexto 5">
-            <a:extLst>
-              <a:ext uri="{FF2B5EF4-FFF2-40B4-BE49-F238E27FC236}">
-                <a16:creationId xmlns:a16="http://schemas.microsoft.com/office/drawing/2014/main" id="{575070AD-F618-89D8-61C5-E4342FE12DB7}"/>
+                <a16:creationId xmlns:a16="http://schemas.microsoft.com/office/drawing/2014/main" id="{0C8002F3-89E1-9A83-B096-FB0435496C30}"/>
               </a:ext>
             </a:extLst>
           </p:cNvPr>
@@ -14448,8 +14729,8 @@
         </p:nvSpPr>
         <p:spPr>
           <a:xfrm>
-            <a:off x="4572000" y="1268760"/>
-            <a:ext cx="4248472" cy="4204356"/>
+            <a:off x="251520" y="947905"/>
+            <a:ext cx="5904656" cy="589072"/>
           </a:xfrm>
           <a:prstGeom prst="rect">
             <a:avLst/>
@@ -14462,6 +14743,54 @@
           </a:bodyPr>
           <a:lstStyle/>
           <a:p>
+            <a:pPr marL="285750" indent="-285750">
+              <a:lnSpc>
+                <a:spcPct val="150000"/>
+              </a:lnSpc>
+              <a:buClr>
+                <a:srgbClr val="ED265B"/>
+              </a:buClr>
+              <a:buFont typeface="Wingdings" panose="05000000000000000000" pitchFamily="2" charset="2"/>
+              <a:buChar char="v"/>
+            </a:pPr>
+            <a:r>
+              <a:rPr lang="en-US" sz="2400" dirty="0">
+                <a:latin typeface="Gotham HTF Light"/>
+                <a:cs typeface="Gotham HTF Light"/>
+              </a:rPr>
+              <a:t>Gradient Boosting</a:t>
+            </a:r>
+          </a:p>
+        </p:txBody>
+      </p:sp>
+      <p:sp>
+        <p:nvSpPr>
+          <p:cNvPr id="6" name="CaixaDeTexto 5">
+            <a:extLst>
+              <a:ext uri="{FF2B5EF4-FFF2-40B4-BE49-F238E27FC236}">
+                <a16:creationId xmlns:a16="http://schemas.microsoft.com/office/drawing/2014/main" id="{63091C20-C88A-F5B9-D3EA-7D8C0C6AE04C}"/>
+              </a:ext>
+            </a:extLst>
+          </p:cNvPr>
+          <p:cNvSpPr txBox="1"/>
+          <p:nvPr/>
+        </p:nvSpPr>
+        <p:spPr>
+          <a:xfrm>
+            <a:off x="251520" y="1556792"/>
+            <a:ext cx="7704856" cy="617733"/>
+          </a:xfrm>
+          <a:prstGeom prst="rect">
+            <a:avLst/>
+          </a:prstGeom>
+          <a:noFill/>
+        </p:spPr>
+        <p:txBody>
+          <a:bodyPr wrap="square">
+            <a:spAutoFit/>
+          </a:bodyPr>
+          <a:lstStyle/>
+          <a:p>
             <a:pPr marL="800100" lvl="1" indent="-342900">
               <a:lnSpc>
                 <a:spcPct val="150000"/>
@@ -14473,74 +14802,101 @@
               <a:buChar char="Ø"/>
             </a:pPr>
             <a:r>
-              <a:rPr lang="pt-BR" dirty="0">
-                <a:latin typeface="Gotham HTF"/>
-              </a:rPr>
-              <a:t>a matriz de correlação é uma ferramenta utilizada na análise exploratória de dados, pois ajuda a identificar as relações mais fortes e mais fracas entre as variáveis. </a:t>
-            </a:r>
-          </a:p>
-          <a:p>
-            <a:pPr marL="800100" lvl="1" indent="-342900">
-              <a:lnSpc>
-                <a:spcPct val="150000"/>
-              </a:lnSpc>
-              <a:buClr>
-                <a:srgbClr val="ED265B"/>
-              </a:buClr>
-              <a:buFont typeface="Wingdings" panose="05000000000000000000" pitchFamily="2" charset="2"/>
-              <a:buChar char="Ø"/>
-            </a:pPr>
-            <a:endParaRPr lang="pt-BR" dirty="0">
-              <a:latin typeface="Gotham HTF"/>
-            </a:endParaRPr>
-          </a:p>
-          <a:p>
-            <a:pPr marL="800100" lvl="1" indent="-342900">
-              <a:lnSpc>
-                <a:spcPct val="150000"/>
-              </a:lnSpc>
-              <a:buClr>
-                <a:srgbClr val="ED265B"/>
-              </a:buClr>
-              <a:buFont typeface="Wingdings" panose="05000000000000000000" pitchFamily="2" charset="2"/>
-              <a:buChar char="Ø"/>
-            </a:pPr>
-            <a:r>
-              <a:rPr lang="pt-BR" dirty="0">
-                <a:latin typeface="Gotham HTF"/>
-              </a:rPr>
-              <a:t>Pode ser usada para selecionar as variáveis mais importantes para a modelagem e pode ajudar a evitar problemas de </a:t>
-            </a:r>
-            <a:r>
-              <a:rPr lang="pt-BR" dirty="0" err="1">
-                <a:latin typeface="Gotham HTF"/>
-              </a:rPr>
-              <a:t>multicolinearidade</a:t>
-            </a:r>
-            <a:endParaRPr lang="en-US" sz="1400" dirty="0">
+              <a:rPr lang="pt-BR" sz="1200" dirty="0"/>
+              <a:t>Algoritmo que emprega a técnica de </a:t>
+            </a:r>
+            <a:r>
+              <a:rPr lang="pt-BR" sz="1200" dirty="0" err="1"/>
+              <a:t>boosting</a:t>
+            </a:r>
+            <a:r>
+              <a:rPr lang="pt-BR" sz="1200" dirty="0"/>
+              <a:t>, visando tentar minimizar o erro residual proveniente do modelo fraco anterior. </a:t>
+            </a:r>
+            <a:endParaRPr lang="pt-BR" sz="1200" dirty="0">
               <a:latin typeface="Gotham HTF"/>
               <a:cs typeface="Gotham HTF Light"/>
             </a:endParaRPr>
           </a:p>
         </p:txBody>
       </p:sp>
+      <p:pic>
+        <p:nvPicPr>
+          <p:cNvPr id="4" name="Imagem 3">
+            <a:extLst>
+              <a:ext uri="{FF2B5EF4-FFF2-40B4-BE49-F238E27FC236}">
+                <a16:creationId xmlns:a16="http://schemas.microsoft.com/office/drawing/2014/main" id="{A2815193-5752-A4A8-1BF9-ABDDB68A4CEA}"/>
+              </a:ext>
+            </a:extLst>
+          </p:cNvPr>
+          <p:cNvPicPr>
+            <a:picLocks noChangeAspect="1"/>
+          </p:cNvPicPr>
+          <p:nvPr/>
+        </p:nvPicPr>
+        <p:blipFill>
+          <a:blip r:embed="rId3"/>
+          <a:stretch>
+            <a:fillRect/>
+          </a:stretch>
+        </p:blipFill>
+        <p:spPr>
+          <a:xfrm>
+            <a:off x="952500" y="2132856"/>
+            <a:ext cx="7239000" cy="1914525"/>
+          </a:xfrm>
+          <a:prstGeom prst="rect">
+            <a:avLst/>
+          </a:prstGeom>
+        </p:spPr>
+      </p:pic>
+      <p:pic>
+        <p:nvPicPr>
+          <p:cNvPr id="7" name="Imagem 6">
+            <a:extLst>
+              <a:ext uri="{FF2B5EF4-FFF2-40B4-BE49-F238E27FC236}">
+                <a16:creationId xmlns:a16="http://schemas.microsoft.com/office/drawing/2014/main" id="{0FAAFC2D-91CB-699A-B9EA-5DE56F3C5484}"/>
+              </a:ext>
+            </a:extLst>
+          </p:cNvPr>
+          <p:cNvPicPr>
+            <a:picLocks noChangeAspect="1"/>
+          </p:cNvPicPr>
+          <p:nvPr/>
+        </p:nvPicPr>
+        <p:blipFill>
+          <a:blip r:embed="rId4"/>
+          <a:stretch>
+            <a:fillRect/>
+          </a:stretch>
+        </p:blipFill>
+        <p:spPr>
+          <a:xfrm>
+            <a:off x="755576" y="3933056"/>
+            <a:ext cx="7343775" cy="2486025"/>
+          </a:xfrm>
+          <a:prstGeom prst="rect">
+            <a:avLst/>
+          </a:prstGeom>
+        </p:spPr>
+      </p:pic>
     </p:spTree>
     <p:extLst>
       <p:ext uri="{BB962C8B-B14F-4D97-AF65-F5344CB8AC3E}">
-        <p14:creationId xmlns:p14="http://schemas.microsoft.com/office/powerpoint/2010/main" val="182877950"/>
+        <p14:creationId xmlns:p14="http://schemas.microsoft.com/office/powerpoint/2010/main" val="387676963"/>
       </p:ext>
     </p:extLst>
   </p:cSld>
   <p:clrMapOvr>
     <a:masterClrMapping/>
   </p:clrMapOvr>
-  <mc:AlternateContent xmlns:mc="http://schemas.openxmlformats.org/markup-compatibility/2006" xmlns:p14="http://schemas.microsoft.com/office/powerpoint/2010/main">
-    <mc:Choice Requires="p14">
+  <mc:AlternateContent xmlns:mc="http://schemas.openxmlformats.org/markup-compatibility/2006">
+    <mc:Choice xmlns:p14="http://schemas.microsoft.com/office/powerpoint/2010/main" Requires="p14">
       <p:transition spd="med" p14:dur="700">
         <p:fade/>
       </p:transition>
     </mc:Choice>
-    <mc:Fallback xmlns="">
+    <mc:Fallback>
       <p:transition spd="med">
         <p:fade/>
       </p:transition>
@@ -14580,6 +14936,59 @@
                                           </p:stCondLst>
                                         </p:cTn>
                                         <p:tgtEl>
+                                          <p:spTgt spid="3"/>
+                                        </p:tgtEl>
+                                        <p:attrNameLst>
+                                          <p:attrName>style.visibility</p:attrName>
+                                        </p:attrNameLst>
+                                      </p:cBhvr>
+                                      <p:to>
+                                        <p:strVal val="visible"/>
+                                      </p:to>
+                                    </p:set>
+                                    <p:animEffect transition="in" filter="fade">
+                                      <p:cBhvr>
+                                        <p:cTn id="7" dur="500"/>
+                                        <p:tgtEl>
+                                          <p:spTgt spid="3"/>
+                                        </p:tgtEl>
+                                      </p:cBhvr>
+                                    </p:animEffect>
+                                  </p:childTnLst>
+                                </p:cTn>
+                              </p:par>
+                            </p:childTnLst>
+                          </p:cTn>
+                        </p:par>
+                      </p:childTnLst>
+                    </p:cTn>
+                  </p:par>
+                  <p:par>
+                    <p:cTn id="8" fill="hold">
+                      <p:stCondLst>
+                        <p:cond delay="indefinite"/>
+                      </p:stCondLst>
+                      <p:childTnLst>
+                        <p:par>
+                          <p:cTn id="9" fill="hold">
+                            <p:stCondLst>
+                              <p:cond delay="0"/>
+                            </p:stCondLst>
+                            <p:childTnLst>
+                              <p:par>
+                                <p:cTn id="10" presetID="10" presetClass="entr" presetSubtype="0" fill="hold" grpId="0" nodeType="clickEffect">
+                                  <p:stCondLst>
+                                    <p:cond delay="0"/>
+                                  </p:stCondLst>
+                                  <p:childTnLst>
+                                    <p:set>
+                                      <p:cBhvr>
+                                        <p:cTn id="11" dur="1" fill="hold">
+                                          <p:stCondLst>
+                                            <p:cond delay="0"/>
+                                          </p:stCondLst>
+                                        </p:cTn>
+                                        <p:tgtEl>
                                           <p:spTgt spid="6"/>
                                         </p:tgtEl>
                                         <p:attrNameLst>
@@ -14592,7 +15001,7 @@
                                     </p:set>
                                     <p:animEffect transition="in" filter="fade">
                                       <p:cBhvr>
-                                        <p:cTn id="7" dur="500"/>
+                                        <p:cTn id="12" dur="500"/>
                                         <p:tgtEl>
                                           <p:spTgt spid="6"/>
                                         </p:tgtEl>
@@ -14629,6 +15038,7 @@
       </p:par>
     </p:tnLst>
     <p:bldLst>
+      <p:bldP spid="3" grpId="0"/>
       <p:bldP spid="6" grpId="0"/>
     </p:bldLst>
   </p:timing>

</xml_diff>